<commit_message>
ePO meeting WG preparation
</commit_message>
<xml_diff>
--- a/v2.0.2/03-Analysis and design/eForms2ePO/IssuesMaterialsForDiscussion-20200107.pptx
+++ b/v2.0.2/03-Analysis and design/eForms2ePO/IssuesMaterialsForDiscussion-20200107.pptx
@@ -3478,8 +3478,8 @@
 </file>
 
 <file path=customXml/item1.xml><?xml version="1.0" encoding="utf-8"?>
-<ct:contentTypeSchema xmlns:ct="http://schemas.microsoft.com/office/2006/metadata/contentType" xmlns:ma="http://schemas.microsoft.com/office/2006/metadata/properties/metaAttributes" ct:_="" ma:_="" ma:contentTypeName="Document" ma:contentTypeID="0x0101001D0A01FC211A0A44AF46DCFC7788647F" ma:contentTypeVersion="6" ma:contentTypeDescription="Create a new document." ma:contentTypeScope="" ma:versionID="6d4e96bf94687d15d23c3e62fa47a898">
-  <xsd:schema xmlns:xsd="http://www.w3.org/2001/XMLSchema" xmlns:xs="http://www.w3.org/2001/XMLSchema" xmlns:p="http://schemas.microsoft.com/office/2006/metadata/properties" xmlns:ns2="8a9dc265-2a70-4a01-bf40-b0bb55b38d64" xmlns:ns3="56068758-a483-4a4b-84d7-1662caf98f10" targetNamespace="http://schemas.microsoft.com/office/2006/metadata/properties" ma:root="true" ma:fieldsID="54b98240f759ae7ad30666c32981af06" ns2:_="" ns3:_="">
+<ct:contentTypeSchema xmlns:ct="http://schemas.microsoft.com/office/2006/metadata/contentType" xmlns:ma="http://schemas.microsoft.com/office/2006/metadata/properties/metaAttributes" ct:_="" ma:_="" ma:contentTypeName="Documento" ma:contentTypeID="0x0101001D0A01FC211A0A44AF46DCFC7788647F" ma:contentTypeVersion="10" ma:contentTypeDescription="Crear nuevo documento." ma:contentTypeScope="" ma:versionID="d0b552c268e14c49f727da8a4278bee4">
+  <xsd:schema xmlns:xsd="http://www.w3.org/2001/XMLSchema" xmlns:xs="http://www.w3.org/2001/XMLSchema" xmlns:p="http://schemas.microsoft.com/office/2006/metadata/properties" xmlns:ns2="8a9dc265-2a70-4a01-bf40-b0bb55b38d64" xmlns:ns3="56068758-a483-4a4b-84d7-1662caf98f10" targetNamespace="http://schemas.microsoft.com/office/2006/metadata/properties" ma:root="true" ma:fieldsID="0145bd77e5eea22887f69a1ea8dc854b" ns2:_="" ns3:_="">
     <xsd:import namespace="8a9dc265-2a70-4a01-bf40-b0bb55b38d64"/>
     <xsd:import namespace="56068758-a483-4a4b-84d7-1662caf98f10"/>
     <xsd:element name="properties">
@@ -3494,6 +3494,10 @@
                 <xsd:element ref="ns3:SharedWithUsers" minOccurs="0"/>
                 <xsd:element ref="ns3:SharedWithDetails" minOccurs="0"/>
                 <xsd:element ref="ns2:MediaServiceOCR" minOccurs="0"/>
+                <xsd:element ref="ns2:MediaServiceAutoKeyPoints" minOccurs="0"/>
+                <xsd:element ref="ns2:MediaServiceKeyPoints" minOccurs="0"/>
+                <xsd:element ref="ns2:MediaServiceGenerationTime" minOccurs="0"/>
+                <xsd:element ref="ns2:MediaServiceEventHashCode" minOccurs="0"/>
               </xsd:all>
             </xsd:complexType>
           </xsd:element>
@@ -3526,11 +3530,33 @@
         </xsd:restriction>
       </xsd:simpleType>
     </xsd:element>
+    <xsd:element name="MediaServiceAutoKeyPoints" ma:index="14" nillable="true" ma:displayName="MediaServiceAutoKeyPoints" ma:hidden="true" ma:internalName="MediaServiceAutoKeyPoints" ma:readOnly="true">
+      <xsd:simpleType>
+        <xsd:restriction base="dms:Note"/>
+      </xsd:simpleType>
+    </xsd:element>
+    <xsd:element name="MediaServiceKeyPoints" ma:index="15" nillable="true" ma:displayName="KeyPoints" ma:internalName="MediaServiceKeyPoints" ma:readOnly="true">
+      <xsd:simpleType>
+        <xsd:restriction base="dms:Note">
+          <xsd:maxLength value="255"/>
+        </xsd:restriction>
+      </xsd:simpleType>
+    </xsd:element>
+    <xsd:element name="MediaServiceGenerationTime" ma:index="16" nillable="true" ma:displayName="MediaServiceGenerationTime" ma:hidden="true" ma:internalName="MediaServiceGenerationTime" ma:readOnly="true">
+      <xsd:simpleType>
+        <xsd:restriction base="dms:Text"/>
+      </xsd:simpleType>
+    </xsd:element>
+    <xsd:element name="MediaServiceEventHashCode" ma:index="17" nillable="true" ma:displayName="MediaServiceEventHashCode" ma:hidden="true" ma:internalName="MediaServiceEventHashCode" ma:readOnly="true">
+      <xsd:simpleType>
+        <xsd:restriction base="dms:Text"/>
+      </xsd:simpleType>
+    </xsd:element>
   </xsd:schema>
   <xsd:schema xmlns:xsd="http://www.w3.org/2001/XMLSchema" xmlns:xs="http://www.w3.org/2001/XMLSchema" xmlns:dms="http://schemas.microsoft.com/office/2006/documentManagement/types" xmlns:pc="http://schemas.microsoft.com/office/infopath/2007/PartnerControls" targetNamespace="56068758-a483-4a4b-84d7-1662caf98f10" elementFormDefault="qualified">
     <xsd:import namespace="http://schemas.microsoft.com/office/2006/documentManagement/types"/>
     <xsd:import namespace="http://schemas.microsoft.com/office/infopath/2007/PartnerControls"/>
-    <xsd:element name="SharedWithUsers" ma:index="11" nillable="true" ma:displayName="Shared With" ma:internalName="SharedWithUsers" ma:readOnly="true">
+    <xsd:element name="SharedWithUsers" ma:index="11" nillable="true" ma:displayName="Compartido con" ma:internalName="SharedWithUsers" ma:readOnly="true">
       <xsd:complexType>
         <xsd:complexContent>
           <xsd:extension base="dms:UserMulti">
@@ -3549,7 +3575,7 @@
         </xsd:complexContent>
       </xsd:complexType>
     </xsd:element>
-    <xsd:element name="SharedWithDetails" ma:index="12" nillable="true" ma:displayName="Shared With Details" ma:internalName="SharedWithDetails" ma:readOnly="true">
+    <xsd:element name="SharedWithDetails" ma:index="12" nillable="true" ma:displayName="Detalles de uso compartido" ma:internalName="SharedWithDetails" ma:readOnly="true">
       <xsd:simpleType>
         <xsd:restriction base="dms:Note">
           <xsd:maxLength value="255"/>
@@ -3566,8 +3592,8 @@
         <xsd:element ref="dc:creator" minOccurs="0" maxOccurs="1"/>
         <xsd:element ref="dcterms:created" minOccurs="0" maxOccurs="1"/>
         <xsd:element ref="dc:identifier" minOccurs="0" maxOccurs="1"/>
-        <xsd:element name="contentType" minOccurs="0" maxOccurs="1" type="xsd:string" ma:index="0" ma:displayName="Content Type"/>
-        <xsd:element ref="dc:title" minOccurs="0" maxOccurs="1" ma:index="4" ma:displayName="Title"/>
+        <xsd:element name="contentType" minOccurs="0" maxOccurs="1" type="xsd:string" ma:index="0" ma:displayName="Tipo de contenido"/>
+        <xsd:element ref="dc:title" minOccurs="0" maxOccurs="1" ma:index="4" ma:displayName="Título"/>
         <xsd:element ref="dc:subject" minOccurs="0" maxOccurs="1"/>
         <xsd:element ref="dc:description" minOccurs="0" maxOccurs="1"/>
         <xsd:element name="keywords" minOccurs="0" maxOccurs="1" type="xsd:string"/>
@@ -3672,7 +3698,7 @@
 </file>
 
 <file path=customXml/itemProps1.xml><?xml version="1.0" encoding="utf-8"?>
-<ds:datastoreItem xmlns:ds="http://schemas.openxmlformats.org/officeDocument/2006/customXml" ds:itemID="{AC83E613-13BB-41F1-9834-E30D66E25A0F}"/>
+<ds:datastoreItem xmlns:ds="http://schemas.openxmlformats.org/officeDocument/2006/customXml" ds:itemID="{2EB0B213-234E-4A2F-AB0A-AEB4419EE206}"/>
 </file>
 
 <file path=customXml/itemProps2.xml><?xml version="1.0" encoding="utf-8"?>

</xml_diff>